<commit_message>
Updated samples and docs during presentation
</commit_message>
<xml_diff>
--- a/docs/04_Parallel_Sort.pptx
+++ b/docs/04_Parallel_Sort.pptx
@@ -119,6 +119,11 @@
       </a:defRPr>
     </a:lvl9pPr>
   </p:defaultTextStyle>
+  <p:extLst>
+    <p:ext uri="{EFAFB233-063F-42B5-8137-9DF3F51BA10A}">
+      <p15:sldGuideLst xmlns:p15="http://schemas.microsoft.com/office/powerpoint/2012/main"/>
+    </p:ext>
+  </p:extLst>
 </p:presentation>
 </file>
 
@@ -204,7 +209,7 @@
           <a:p>
             <a:fld id="{250C38B9-E8E8-4A58-9588-4C68EFC0A42B}" type="datetimeFigureOut">
               <a:rPr lang="en-US" smtClean="0"/>
-              <a:t>10/14/2018</a:t>
+              <a:t>10/22/2018</a:t>
             </a:fld>
             <a:endParaRPr lang="en-US"/>
           </a:p>
@@ -9264,7 +9269,7 @@
           <a:p>
             <a:fld id="{1300EFCE-829E-4856-89D3-9B4068B80437}" type="datetime1">
               <a:rPr lang="en-US" smtClean="0"/>
-              <a:t>10/14/2018</a:t>
+              <a:t>10/22/2018</a:t>
             </a:fld>
             <a:endParaRPr lang="en-US" dirty="0"/>
           </a:p>
@@ -9470,7 +9475,7 @@
           <a:p>
             <a:fld id="{FE6AA90A-25A7-4069-884A-8FCA5D6307D4}" type="datetime1">
               <a:rPr lang="en-US" smtClean="0"/>
-              <a:t>10/14/2018</a:t>
+              <a:t>10/22/2018</a:t>
             </a:fld>
             <a:endParaRPr lang="en-US" dirty="0"/>
           </a:p>
@@ -9649,7 +9654,7 @@
           <a:p>
             <a:fld id="{4E411050-63AE-42AD-9D7D-B8CE9FFF9406}" type="datetime1">
               <a:rPr lang="en-US" smtClean="0"/>
-              <a:t>10/14/2018</a:t>
+              <a:t>10/22/2018</a:t>
             </a:fld>
             <a:endParaRPr lang="en-US" dirty="0"/>
           </a:p>
@@ -9853,7 +9858,7 @@
           <a:p>
             <a:fld id="{27B72CFB-6688-483E-BD1D-85C1482670B7}" type="datetime1">
               <a:rPr lang="en-US" smtClean="0"/>
-              <a:t>10/14/2018</a:t>
+              <a:t>10/22/2018</a:t>
             </a:fld>
             <a:endParaRPr lang="en-US" dirty="0"/>
           </a:p>
@@ -18750,7 +18755,7 @@
           <a:p>
             <a:fld id="{D529DD98-A16F-4151-8911-7742F2164864}" type="datetime1">
               <a:rPr lang="en-US" smtClean="0"/>
-              <a:t>10/14/2018</a:t>
+              <a:t>10/22/2018</a:t>
             </a:fld>
             <a:endParaRPr lang="en-US" dirty="0"/>
           </a:p>
@@ -19023,7 +19028,7 @@
           <a:p>
             <a:fld id="{45930E90-2E00-4865-91FA-295105D04E9B}" type="datetime1">
               <a:rPr lang="en-US" smtClean="0"/>
-              <a:t>10/14/2018</a:t>
+              <a:t>10/22/2018</a:t>
             </a:fld>
             <a:endParaRPr lang="en-US" dirty="0"/>
           </a:p>
@@ -19420,7 +19425,7 @@
           <a:p>
             <a:fld id="{5115B0DA-C9E7-4F4C-8B58-0363E40529AA}" type="datetime1">
               <a:rPr lang="en-US" smtClean="0"/>
-              <a:t>10/14/2018</a:t>
+              <a:t>10/22/2018</a:t>
             </a:fld>
             <a:endParaRPr lang="en-US" dirty="0"/>
           </a:p>
@@ -19537,7 +19542,7 @@
           <a:p>
             <a:fld id="{2DA2EAD2-6A7F-440B-BBA4-398992F304FB}" type="datetime1">
               <a:rPr lang="en-US" smtClean="0"/>
-              <a:t>10/14/2018</a:t>
+              <a:t>10/22/2018</a:t>
             </a:fld>
             <a:endParaRPr lang="en-US" dirty="0"/>
           </a:p>
@@ -19631,7 +19636,7 @@
           <a:p>
             <a:fld id="{A4D069E6-B062-423D-80E1-59AE17AE93DB}" type="datetime1">
               <a:rPr lang="en-US" smtClean="0"/>
-              <a:t>10/14/2018</a:t>
+              <a:t>10/22/2018</a:t>
             </a:fld>
             <a:endParaRPr lang="en-US" dirty="0"/>
           </a:p>
@@ -19920,7 +19925,7 @@
           <a:p>
             <a:fld id="{5F776FEE-F3B5-483B-B3C2-E9E6F579E2DE}" type="datetime1">
               <a:rPr lang="en-US" smtClean="0"/>
-              <a:t>10/14/2018</a:t>
+              <a:t>10/22/2018</a:t>
             </a:fld>
             <a:endParaRPr lang="en-US" dirty="0"/>
           </a:p>
@@ -20199,7 +20204,7 @@
           <a:p>
             <a:fld id="{389C344E-CED3-4D62-8FEF-C3223C6A98E5}" type="datetime1">
               <a:rPr lang="en-US" smtClean="0"/>
-              <a:t>10/14/2018</a:t>
+              <a:t>10/22/2018</a:t>
             </a:fld>
             <a:endParaRPr lang="en-US" dirty="0"/>
           </a:p>
@@ -20448,7 +20453,7 @@
           <a:p>
             <a:fld id="{31ADFBEA-533F-41BC-AA4E-0C3CCFACDD13}" type="datetime1">
               <a:rPr lang="en-US" smtClean="0"/>
-              <a:t>10/14/2018</a:t>
+              <a:t>10/22/2018</a:t>
             </a:fld>
             <a:endParaRPr lang="en-US" dirty="0"/>
           </a:p>
@@ -24855,7 +24860,7 @@
             <p:ph idx="1"/>
             <p:extLst>
               <p:ext uri="{D42A27DB-BD31-4B8C-83A1-F6EECF244321}">
-                <p14:modId xmlns:p14="http://schemas.microsoft.com/office/powerpoint/2010/main" val="4065170572"/>
+                <p14:modId xmlns:p14="http://schemas.microsoft.com/office/powerpoint/2010/main" val="1155107453"/>
               </p:ext>
             </p:extLst>
           </p:nvPr>
@@ -25955,10 +25960,14 @@
                     <a:bodyPr/>
                     <a:lstStyle/>
                     <a:p>
-                      <a:endParaRPr lang="en-US"/>
-                    </a:p>
-                  </a:txBody>
-                  <a:tcPr/>
+                      <a:endParaRPr lang="en-US" dirty="0"/>
+                    </a:p>
+                  </a:txBody>
+                  <a:tcPr>
+                    <a:solidFill>
+                      <a:srgbClr val="FFC000"/>
+                    </a:solidFill>
+                  </a:tcPr>
                 </a:tc>
                 <a:tc>
                   <a:txBody>
@@ -27822,7 +27831,7 @@
             <p:ph sz="half" idx="2"/>
             <p:extLst>
               <p:ext uri="{D42A27DB-BD31-4B8C-83A1-F6EECF244321}">
-                <p14:modId xmlns:p14="http://schemas.microsoft.com/office/powerpoint/2010/main" val="125089662"/>
+                <p14:modId xmlns:p14="http://schemas.microsoft.com/office/powerpoint/2010/main" val="76942614"/>
               </p:ext>
             </p:extLst>
           </p:nvPr>
@@ -28362,7 +28371,7 @@
         <p:spPr>
           <a:xfrm>
             <a:off x="1024127" y="4262659"/>
-            <a:ext cx="9720072" cy="1938992"/>
+            <a:ext cx="9720072" cy="2246769"/>
           </a:xfrm>
           <a:prstGeom prst="rect">
             <a:avLst/>
@@ -28398,8 +28407,27 @@
           <a:p>
             <a:r>
               <a:rPr lang="en-US" sz="2000" dirty="0"/>
-              <a:t>	Serial only moves the head</a:t>
+              <a:t>	Serial only moves the head for assignment</a:t>
             </a:r>
+          </a:p>
+          <a:p>
+            <a:r>
+              <a:rPr lang="en-US" sz="2000" dirty="0"/>
+              <a:t>	Copy </a:t>
+            </a:r>
+            <a:r>
+              <a:rPr lang="en-US" sz="2000" dirty="0" err="1"/>
+              <a:t>Ctor</a:t>
+            </a:r>
+            <a:r>
+              <a:rPr lang="en-US" sz="2000" dirty="0"/>
+              <a:t> would take nearly the same time </a:t>
+            </a:r>
+            <a:r>
+              <a:rPr lang="en-US" sz="2000"/>
+              <a:t>as Parallel Copy</a:t>
+            </a:r>
+            <a:endParaRPr lang="en-US" sz="2000" dirty="0"/>
           </a:p>
           <a:p>
             <a:r>

</xml_diff>